<commit_message>
gui update - colors etc
</commit_message>
<xml_diff>
--- a/Prezentacja_projektu.pptx
+++ b/Prezentacja_projektu.pptx
@@ -16,10 +16,11 @@
     <p:sldId id="267" r:id="rId10"/>
     <p:sldId id="269" r:id="rId11"/>
     <p:sldId id="270" r:id="rId12"/>
-    <p:sldId id="262" r:id="rId13"/>
-    <p:sldId id="263" r:id="rId14"/>
-    <p:sldId id="264" r:id="rId15"/>
-    <p:sldId id="275" r:id="rId16"/>
+    <p:sldId id="276" r:id="rId13"/>
+    <p:sldId id="262" r:id="rId14"/>
+    <p:sldId id="263" r:id="rId15"/>
+    <p:sldId id="264" r:id="rId16"/>
+    <p:sldId id="275" r:id="rId17"/>
   </p:sldIdLst>
   <p:sldSz cx="12192000" cy="6858000"/>
   <p:notesSz cx="6858000" cy="9144000"/>
@@ -275,7 +276,7 @@
           <a:p>
             <a:fld id="{C74ECD49-9B10-46FB-8AFC-220ADEAEF3B7}" type="datetimeFigureOut">
               <a:rPr lang="en-GB" smtClean="0"/>
-              <a:t>26/11/2023</a:t>
+              <a:t>27/11/2023</a:t>
             </a:fld>
             <a:endParaRPr lang="en-GB"/>
           </a:p>
@@ -475,7 +476,7 @@
           <a:p>
             <a:fld id="{C74ECD49-9B10-46FB-8AFC-220ADEAEF3B7}" type="datetimeFigureOut">
               <a:rPr lang="en-GB" smtClean="0"/>
-              <a:t>26/11/2023</a:t>
+              <a:t>27/11/2023</a:t>
             </a:fld>
             <a:endParaRPr lang="en-GB"/>
           </a:p>
@@ -685,7 +686,7 @@
           <a:p>
             <a:fld id="{C74ECD49-9B10-46FB-8AFC-220ADEAEF3B7}" type="datetimeFigureOut">
               <a:rPr lang="en-GB" smtClean="0"/>
-              <a:t>26/11/2023</a:t>
+              <a:t>27/11/2023</a:t>
             </a:fld>
             <a:endParaRPr lang="en-GB"/>
           </a:p>
@@ -885,7 +886,7 @@
           <a:p>
             <a:fld id="{C74ECD49-9B10-46FB-8AFC-220ADEAEF3B7}" type="datetimeFigureOut">
               <a:rPr lang="en-GB" smtClean="0"/>
-              <a:t>26/11/2023</a:t>
+              <a:t>27/11/2023</a:t>
             </a:fld>
             <a:endParaRPr lang="en-GB"/>
           </a:p>
@@ -1161,7 +1162,7 @@
           <a:p>
             <a:fld id="{C74ECD49-9B10-46FB-8AFC-220ADEAEF3B7}" type="datetimeFigureOut">
               <a:rPr lang="en-GB" smtClean="0"/>
-              <a:t>26/11/2023</a:t>
+              <a:t>27/11/2023</a:t>
             </a:fld>
             <a:endParaRPr lang="en-GB"/>
           </a:p>
@@ -1429,7 +1430,7 @@
           <a:p>
             <a:fld id="{C74ECD49-9B10-46FB-8AFC-220ADEAEF3B7}" type="datetimeFigureOut">
               <a:rPr lang="en-GB" smtClean="0"/>
-              <a:t>26/11/2023</a:t>
+              <a:t>27/11/2023</a:t>
             </a:fld>
             <a:endParaRPr lang="en-GB"/>
           </a:p>
@@ -1844,7 +1845,7 @@
           <a:p>
             <a:fld id="{C74ECD49-9B10-46FB-8AFC-220ADEAEF3B7}" type="datetimeFigureOut">
               <a:rPr lang="en-GB" smtClean="0"/>
-              <a:t>26/11/2023</a:t>
+              <a:t>27/11/2023</a:t>
             </a:fld>
             <a:endParaRPr lang="en-GB"/>
           </a:p>
@@ -1986,7 +1987,7 @@
           <a:p>
             <a:fld id="{C74ECD49-9B10-46FB-8AFC-220ADEAEF3B7}" type="datetimeFigureOut">
               <a:rPr lang="en-GB" smtClean="0"/>
-              <a:t>26/11/2023</a:t>
+              <a:t>27/11/2023</a:t>
             </a:fld>
             <a:endParaRPr lang="en-GB"/>
           </a:p>
@@ -2099,7 +2100,7 @@
           <a:p>
             <a:fld id="{C74ECD49-9B10-46FB-8AFC-220ADEAEF3B7}" type="datetimeFigureOut">
               <a:rPr lang="en-GB" smtClean="0"/>
-              <a:t>26/11/2023</a:t>
+              <a:t>27/11/2023</a:t>
             </a:fld>
             <a:endParaRPr lang="en-GB"/>
           </a:p>
@@ -2412,7 +2413,7 @@
           <a:p>
             <a:fld id="{C74ECD49-9B10-46FB-8AFC-220ADEAEF3B7}" type="datetimeFigureOut">
               <a:rPr lang="en-GB" smtClean="0"/>
-              <a:t>26/11/2023</a:t>
+              <a:t>27/11/2023</a:t>
             </a:fld>
             <a:endParaRPr lang="en-GB"/>
           </a:p>
@@ -2701,7 +2702,7 @@
           <a:p>
             <a:fld id="{C74ECD49-9B10-46FB-8AFC-220ADEAEF3B7}" type="datetimeFigureOut">
               <a:rPr lang="en-GB" smtClean="0"/>
-              <a:t>26/11/2023</a:t>
+              <a:t>27/11/2023</a:t>
             </a:fld>
             <a:endParaRPr lang="en-GB"/>
           </a:p>
@@ -2944,7 +2945,7 @@
           <a:p>
             <a:fld id="{C74ECD49-9B10-46FB-8AFC-220ADEAEF3B7}" type="datetimeFigureOut">
               <a:rPr lang="en-GB" smtClean="0"/>
-              <a:t>26/11/2023</a:t>
+              <a:t>27/11/2023</a:t>
             </a:fld>
             <a:endParaRPr lang="en-GB"/>
           </a:p>
@@ -4269,15 +4270,9 @@
   <p:cSld>
     <p:bg>
       <p:bgPr>
-        <a:blipFill dpi="0" rotWithShape="1">
-          <a:blip r:embed="rId2">
-            <a:lum/>
-          </a:blip>
-          <a:srcRect/>
-          <a:stretch>
-            <a:fillRect/>
-          </a:stretch>
-        </a:blipFill>
+        <a:solidFill>
+          <a:schemeClr val="bg1"/>
+        </a:solidFill>
         <a:effectLst/>
       </p:bgPr>
     </p:bg>
@@ -4295,50 +4290,63 @@
           <a:chExt cx="0" cy="0"/>
         </a:xfrm>
       </p:grpSpPr>
-      <p:sp>
-        <p:nvSpPr>
-          <p:cNvPr id="2" name="pole tekstowe 1">
-            <a:extLst>
-              <a:ext uri="{FF2B5EF4-FFF2-40B4-BE49-F238E27FC236}">
-                <a16:creationId xmlns:a16="http://schemas.microsoft.com/office/drawing/2014/main" id="{0C5113C2-06B9-EDB0-4016-02258C395D0C}"/>
-              </a:ext>
-            </a:extLst>
-          </p:cNvPr>
-          <p:cNvSpPr txBox="1"/>
-          <p:nvPr/>
+      <p:sp useBgFill="1">
+        <p:nvSpPr>
+          <p:cNvPr id="35" name="Rectangle 15">
+            <a:extLst>
+              <a:ext uri="{FF2B5EF4-FFF2-40B4-BE49-F238E27FC236}">
+                <a16:creationId xmlns:a16="http://schemas.microsoft.com/office/drawing/2014/main" id="{50CEED20-A22C-4FC3-BC0E-F4FE53FDEB97}"/>
+              </a:ext>
+              <a:ext uri="{C183D7F6-B498-43B3-948B-1728B52AA6E4}">
+                <adec:decorative xmlns:adec="http://schemas.microsoft.com/office/drawing/2017/decorative" val="1"/>
+              </a:ext>
+            </a:extLst>
+          </p:cNvPr>
+          <p:cNvSpPr>
+            <a:spLocks noGrp="1" noRot="1" noChangeAspect="1" noMove="1" noResize="1" noEditPoints="1" noAdjustHandles="1" noChangeArrowheads="1" noChangeShapeType="1" noTextEdit="1"/>
+          </p:cNvSpPr>
+          <p:nvPr>
+            <p:extLst>
+              <p:ext uri="{386F3935-93C4-4BCD-93E2-E3B085C9AB24}">
+                <p16:designElem xmlns:p16="http://schemas.microsoft.com/office/powerpoint/2015/main" val="1"/>
+              </p:ext>
+            </p:extLst>
+          </p:nvPr>
         </p:nvSpPr>
         <p:spPr>
           <a:xfrm>
-            <a:off x="5065280" y="2782669"/>
-            <a:ext cx="2061439" cy="646331"/>
+            <a:off x="0" y="0"/>
+            <a:ext cx="12191999" cy="6857365"/>
           </a:xfrm>
           <a:prstGeom prst="rect">
             <a:avLst/>
           </a:prstGeom>
-          <a:noFill/>
-        </p:spPr>
-        <p:txBody>
-          <a:bodyPr wrap="square" rtlCol="0">
-            <a:spAutoFit/>
-          </a:bodyPr>
-          <a:lstStyle/>
-          <a:p>
-            <a:endParaRPr lang="pl-PL" dirty="0"/>
-          </a:p>
-          <a:p>
-            <a:r>
-              <a:rPr lang="pl-PL" dirty="0"/>
-              <a:t>*</a:t>
-            </a:r>
-            <a:r>
-              <a:rPr lang="pl-PL" dirty="0" err="1"/>
-              <a:t>Screen</a:t>
-            </a:r>
-            <a:r>
-              <a:rPr lang="pl-PL" dirty="0"/>
-              <a:t> interfejsu</a:t>
-            </a:r>
-            <a:endParaRPr lang="en-GB" dirty="0"/>
+          <a:ln>
+            <a:noFill/>
+          </a:ln>
+        </p:spPr>
+        <p:style>
+          <a:lnRef idx="2">
+            <a:schemeClr val="accent1">
+              <a:shade val="50000"/>
+            </a:schemeClr>
+          </a:lnRef>
+          <a:fillRef idx="1">
+            <a:schemeClr val="accent1"/>
+          </a:fillRef>
+          <a:effectRef idx="0">
+            <a:schemeClr val="accent1"/>
+          </a:effectRef>
+          <a:fontRef idx="minor">
+            <a:schemeClr val="lt1"/>
+          </a:fontRef>
+        </p:style>
+        <p:txBody>
+          <a:bodyPr rtlCol="0" anchor="ctr"/>
+          <a:lstStyle/>
+          <a:p>
+            <a:pPr algn="ctr"/>
+            <a:endParaRPr lang="en-US"/>
           </a:p>
         </p:txBody>
       </p:sp>
@@ -4356,31 +4364,36 @@
         </p:nvSpPr>
         <p:spPr>
           <a:xfrm>
-            <a:off x="2947469" y="351323"/>
-            <a:ext cx="6297061" cy="590931"/>
+            <a:off x="1113810" y="2825248"/>
+            <a:ext cx="4036334" cy="2387600"/>
           </a:xfrm>
           <a:prstGeom prst="rect">
             <a:avLst/>
           </a:prstGeom>
-          <a:noFill/>
-        </p:spPr>
-        <p:txBody>
-          <a:bodyPr wrap="square">
-            <a:spAutoFit/>
+        </p:spPr>
+        <p:txBody>
+          <a:bodyPr vert="horz" lIns="91440" tIns="45720" rIns="91440" bIns="45720" rtlCol="0" anchor="t">
+            <a:normAutofit/>
           </a:bodyPr>
           <a:lstStyle/>
           <a:p>
-            <a:pPr algn="ctr">
+            <a:pPr>
               <a:lnSpc>
                 <a:spcPct val="90000"/>
               </a:lnSpc>
               <a:spcBef>
                 <a:spcPct val="0"/>
               </a:spcBef>
+              <a:spcAft>
+                <a:spcPts val="600"/>
+              </a:spcAft>
             </a:pPr>
             <a:r>
-              <a:rPr lang="pl-PL" sz="3600" b="1" dirty="0">
+              <a:rPr lang="en-US" sz="5400" b="1" kern="1200">
                 <a:ln w="0"/>
+                <a:solidFill>
+                  <a:schemeClr val="tx1"/>
+                </a:solidFill>
                 <a:effectLst>
                   <a:outerShdw blurRad="38100" dist="19050" dir="2700000" algn="tl" rotWithShape="0">
                     <a:schemeClr val="dk1">
@@ -4388,26 +4401,390 @@
                     </a:schemeClr>
                   </a:outerShdw>
                 </a:effectLst>
+                <a:latin typeface="+mj-lt"/>
                 <a:ea typeface="+mj-ea"/>
-                <a:cs typeface="Times New Roman" panose="02020603050405020304" pitchFamily="18" charset="0"/>
+                <a:cs typeface="+mj-cs"/>
               </a:rPr>
               <a:t>Aplikacja</a:t>
             </a:r>
-            <a:endParaRPr lang="en-US" sz="3600" b="1" dirty="0">
-              <a:ln w="0"/>
-              <a:effectLst>
-                <a:outerShdw blurRad="38100" dist="19050" dir="2700000" algn="tl" rotWithShape="0">
-                  <a:schemeClr val="dk1">
-                    <a:alpha val="40000"/>
-                  </a:schemeClr>
-                </a:outerShdw>
-              </a:effectLst>
-              <a:ea typeface="+mj-ea"/>
-              <a:cs typeface="Times New Roman" panose="02020603050405020304" pitchFamily="18" charset="0"/>
-            </a:endParaRPr>
-          </a:p>
-        </p:txBody>
-      </p:sp>
+          </a:p>
+        </p:txBody>
+      </p:sp>
+      <p:grpSp>
+        <p:nvGrpSpPr>
+          <p:cNvPr id="18" name="Group 17">
+            <a:extLst>
+              <a:ext uri="{FF2B5EF4-FFF2-40B4-BE49-F238E27FC236}">
+                <a16:creationId xmlns:a16="http://schemas.microsoft.com/office/drawing/2014/main" id="{032D8612-31EB-44CF-A1D0-14FD4C705424}"/>
+              </a:ext>
+              <a:ext uri="{C183D7F6-B498-43B3-948B-1728B52AA6E4}">
+                <adec:decorative xmlns:adec="http://schemas.microsoft.com/office/drawing/2017/decorative" val="1"/>
+              </a:ext>
+            </a:extLst>
+          </p:cNvPr>
+          <p:cNvGrpSpPr>
+            <a:grpSpLocks noGrp="1" noUngrp="1" noRot="1" noChangeAspect="1" noMove="1" noResize="1"/>
+          </p:cNvGrpSpPr>
+          <p:nvPr>
+            <p:extLst>
+              <p:ext uri="{386F3935-93C4-4BCD-93E2-E3B085C9AB24}">
+                <p16:designElem xmlns:p16="http://schemas.microsoft.com/office/powerpoint/2015/main" val="1"/>
+              </p:ext>
+            </p:extLst>
+          </p:nvPr>
+        </p:nvGrpSpPr>
+        <p:grpSpPr>
+          <a:xfrm>
+            <a:off x="0" y="2849524"/>
+            <a:ext cx="731521" cy="673460"/>
+            <a:chOff x="3940602" y="308034"/>
+            <a:chExt cx="2116791" cy="3428999"/>
+          </a:xfrm>
+          <a:solidFill>
+            <a:schemeClr val="accent4"/>
+          </a:solidFill>
+        </p:grpSpPr>
+        <p:sp>
+          <p:nvSpPr>
+            <p:cNvPr id="36" name="Rectangle 18">
+              <a:extLst>
+                <a:ext uri="{FF2B5EF4-FFF2-40B4-BE49-F238E27FC236}">
+                  <a16:creationId xmlns:a16="http://schemas.microsoft.com/office/drawing/2014/main" id="{F19A4A0F-1B59-4DB0-9764-D10936E98770}"/>
+                </a:ext>
+                <a:ext uri="{C183D7F6-B498-43B3-948B-1728B52AA6E4}">
+                  <adec:decorative xmlns:adec="http://schemas.microsoft.com/office/drawing/2017/decorative" val="1"/>
+                </a:ext>
+              </a:extLst>
+            </p:cNvPr>
+            <p:cNvSpPr/>
+            <p:nvPr>
+              <p:extLst>
+                <p:ext uri="{386F3935-93C4-4BCD-93E2-E3B085C9AB24}">
+                  <p16:designElem xmlns:p16="http://schemas.microsoft.com/office/powerpoint/2015/main" val="1"/>
+                </p:ext>
+              </p:extLst>
+            </p:nvPr>
+          </p:nvSpPr>
+          <p:spPr>
+            <a:xfrm>
+              <a:off x="3940602" y="308034"/>
+              <a:ext cx="566743" cy="3428999"/>
+            </a:xfrm>
+            <a:prstGeom prst="rect">
+              <a:avLst/>
+            </a:prstGeom>
+            <a:grpFill/>
+            <a:ln>
+              <a:noFill/>
+            </a:ln>
+          </p:spPr>
+          <p:style>
+            <a:lnRef idx="2">
+              <a:schemeClr val="accent1">
+                <a:shade val="50000"/>
+              </a:schemeClr>
+            </a:lnRef>
+            <a:fillRef idx="1">
+              <a:schemeClr val="accent1"/>
+            </a:fillRef>
+            <a:effectRef idx="0">
+              <a:schemeClr val="accent1"/>
+            </a:effectRef>
+            <a:fontRef idx="minor">
+              <a:schemeClr val="lt1"/>
+            </a:fontRef>
+          </p:style>
+          <p:txBody>
+            <a:bodyPr rtlCol="0" anchor="ctr"/>
+            <a:lstStyle/>
+            <a:p>
+              <a:pPr algn="ctr"/>
+              <a:endParaRPr lang="en-US"/>
+            </a:p>
+          </p:txBody>
+        </p:sp>
+        <p:sp>
+          <p:nvSpPr>
+            <p:cNvPr id="37" name="Rectangle 19">
+              <a:extLst>
+                <a:ext uri="{FF2B5EF4-FFF2-40B4-BE49-F238E27FC236}">
+                  <a16:creationId xmlns:a16="http://schemas.microsoft.com/office/drawing/2014/main" id="{F399A70F-F8CD-4992-9EF5-6CF15472E73F}"/>
+                </a:ext>
+                <a:ext uri="{C183D7F6-B498-43B3-948B-1728B52AA6E4}">
+                  <adec:decorative xmlns:adec="http://schemas.microsoft.com/office/drawing/2017/decorative" val="1"/>
+                </a:ext>
+              </a:extLst>
+            </p:cNvPr>
+            <p:cNvSpPr/>
+            <p:nvPr>
+              <p:extLst>
+                <p:ext uri="{386F3935-93C4-4BCD-93E2-E3B085C9AB24}">
+                  <p16:designElem xmlns:p16="http://schemas.microsoft.com/office/powerpoint/2015/main" val="1"/>
+                </p:ext>
+              </p:extLst>
+            </p:nvPr>
+          </p:nvSpPr>
+          <p:spPr>
+            <a:xfrm>
+              <a:off x="4715626" y="308034"/>
+              <a:ext cx="566743" cy="3428999"/>
+            </a:xfrm>
+            <a:prstGeom prst="rect">
+              <a:avLst/>
+            </a:prstGeom>
+            <a:grpFill/>
+            <a:ln>
+              <a:noFill/>
+            </a:ln>
+          </p:spPr>
+          <p:style>
+            <a:lnRef idx="2">
+              <a:schemeClr val="accent1">
+                <a:shade val="50000"/>
+              </a:schemeClr>
+            </a:lnRef>
+            <a:fillRef idx="1">
+              <a:schemeClr val="accent1"/>
+            </a:fillRef>
+            <a:effectRef idx="0">
+              <a:schemeClr val="accent1"/>
+            </a:effectRef>
+            <a:fontRef idx="minor">
+              <a:schemeClr val="lt1"/>
+            </a:fontRef>
+          </p:style>
+          <p:txBody>
+            <a:bodyPr rtlCol="0" anchor="ctr"/>
+            <a:lstStyle/>
+            <a:p>
+              <a:pPr algn="ctr"/>
+              <a:endParaRPr lang="en-US"/>
+            </a:p>
+          </p:txBody>
+        </p:sp>
+        <p:sp>
+          <p:nvSpPr>
+            <p:cNvPr id="38" name="Rectangle 20">
+              <a:extLst>
+                <a:ext uri="{FF2B5EF4-FFF2-40B4-BE49-F238E27FC236}">
+                  <a16:creationId xmlns:a16="http://schemas.microsoft.com/office/drawing/2014/main" id="{48F4FEDC-6D80-458C-A665-075D9B9500FD}"/>
+                </a:ext>
+                <a:ext uri="{C183D7F6-B498-43B3-948B-1728B52AA6E4}">
+                  <adec:decorative xmlns:adec="http://schemas.microsoft.com/office/drawing/2017/decorative" val="1"/>
+                </a:ext>
+              </a:extLst>
+            </p:cNvPr>
+            <p:cNvSpPr/>
+            <p:nvPr>
+              <p:extLst>
+                <p:ext uri="{386F3935-93C4-4BCD-93E2-E3B085C9AB24}">
+                  <p16:designElem xmlns:p16="http://schemas.microsoft.com/office/powerpoint/2015/main" val="1"/>
+                </p:ext>
+              </p:extLst>
+            </p:nvPr>
+          </p:nvSpPr>
+          <p:spPr>
+            <a:xfrm>
+              <a:off x="5490650" y="308034"/>
+              <a:ext cx="566743" cy="3428999"/>
+            </a:xfrm>
+            <a:prstGeom prst="rect">
+              <a:avLst/>
+            </a:prstGeom>
+            <a:grpFill/>
+            <a:ln>
+              <a:noFill/>
+            </a:ln>
+          </p:spPr>
+          <p:style>
+            <a:lnRef idx="2">
+              <a:schemeClr val="accent1">
+                <a:shade val="50000"/>
+              </a:schemeClr>
+            </a:lnRef>
+            <a:fillRef idx="1">
+              <a:schemeClr val="accent1"/>
+            </a:fillRef>
+            <a:effectRef idx="0">
+              <a:schemeClr val="accent1"/>
+            </a:effectRef>
+            <a:fontRef idx="minor">
+              <a:schemeClr val="lt1"/>
+            </a:fontRef>
+          </p:style>
+          <p:txBody>
+            <a:bodyPr rtlCol="0" anchor="ctr"/>
+            <a:lstStyle/>
+            <a:p>
+              <a:pPr algn="ctr"/>
+              <a:endParaRPr lang="en-US"/>
+            </a:p>
+          </p:txBody>
+        </p:sp>
+      </p:grpSp>
+      <p:sp>
+        <p:nvSpPr>
+          <p:cNvPr id="39" name="Rectangle 22">
+            <a:extLst>
+              <a:ext uri="{FF2B5EF4-FFF2-40B4-BE49-F238E27FC236}">
+                <a16:creationId xmlns:a16="http://schemas.microsoft.com/office/drawing/2014/main" id="{19C9EAEA-39D0-4B0E-A0EB-51E7B26740B1}"/>
+              </a:ext>
+              <a:ext uri="{C183D7F6-B498-43B3-948B-1728B52AA6E4}">
+                <adec:decorative xmlns:adec="http://schemas.microsoft.com/office/drawing/2017/decorative" val="1"/>
+              </a:ext>
+            </a:extLst>
+          </p:cNvPr>
+          <p:cNvSpPr>
+            <a:spLocks noGrp="1" noRot="1" noChangeAspect="1" noMove="1" noResize="1" noEditPoints="1" noAdjustHandles="1" noChangeArrowheads="1" noChangeShapeType="1" noTextEdit="1"/>
+          </p:cNvSpPr>
+          <p:nvPr>
+            <p:extLst>
+              <p:ext uri="{386F3935-93C4-4BCD-93E2-E3B085C9AB24}">
+                <p16:designElem xmlns:p16="http://schemas.microsoft.com/office/powerpoint/2015/main" val="1"/>
+              </p:ext>
+            </p:extLst>
+          </p:nvPr>
+        </p:nvSpPr>
+        <p:spPr>
+          <a:xfrm>
+            <a:off x="5685810" y="679732"/>
+            <a:ext cx="6009366" cy="5423880"/>
+          </a:xfrm>
+          <a:prstGeom prst="rect">
+            <a:avLst/>
+          </a:prstGeom>
+          <a:solidFill>
+            <a:schemeClr val="bg1"/>
+          </a:solidFill>
+          <a:ln>
+            <a:noFill/>
+          </a:ln>
+          <a:effectLst>
+            <a:outerShdw blurRad="139700" dist="127000" dir="5400000" algn="t" rotWithShape="0">
+              <a:prstClr val="black">
+                <a:alpha val="15000"/>
+              </a:prstClr>
+            </a:outerShdw>
+          </a:effectLst>
+        </p:spPr>
+        <p:style>
+          <a:lnRef idx="2">
+            <a:schemeClr val="accent1">
+              <a:shade val="50000"/>
+            </a:schemeClr>
+          </a:lnRef>
+          <a:fillRef idx="1">
+            <a:schemeClr val="accent1"/>
+          </a:fillRef>
+          <a:effectRef idx="0">
+            <a:schemeClr val="accent1"/>
+          </a:effectRef>
+          <a:fontRef idx="minor">
+            <a:schemeClr val="lt1"/>
+          </a:fontRef>
+        </p:style>
+        <p:txBody>
+          <a:bodyPr rtlCol="0" anchor="ctr"/>
+          <a:lstStyle/>
+          <a:p>
+            <a:pPr algn="ctr"/>
+            <a:endParaRPr lang="en-US"/>
+          </a:p>
+        </p:txBody>
+      </p:sp>
+      <p:sp>
+        <p:nvSpPr>
+          <p:cNvPr id="40" name="Rectangle 24">
+            <a:extLst>
+              <a:ext uri="{FF2B5EF4-FFF2-40B4-BE49-F238E27FC236}">
+                <a16:creationId xmlns:a16="http://schemas.microsoft.com/office/drawing/2014/main" id="{3873B707-463F-40B0-8227-E8CC6C67EB25}"/>
+              </a:ext>
+              <a:ext uri="{C183D7F6-B498-43B3-948B-1728B52AA6E4}">
+                <adec:decorative xmlns:adec="http://schemas.microsoft.com/office/drawing/2017/decorative" val="1"/>
+              </a:ext>
+            </a:extLst>
+          </p:cNvPr>
+          <p:cNvSpPr>
+            <a:spLocks noGrp="1" noRot="1" noChangeAspect="1" noMove="1" noResize="1" noEditPoints="1" noAdjustHandles="1" noChangeArrowheads="1" noChangeShapeType="1" noTextEdit="1"/>
+          </p:cNvSpPr>
+          <p:nvPr>
+            <p:extLst>
+              <p:ext uri="{386F3935-93C4-4BCD-93E2-E3B085C9AB24}">
+                <p16:designElem xmlns:p16="http://schemas.microsoft.com/office/powerpoint/2015/main" val="1"/>
+              </p:ext>
+            </p:extLst>
+          </p:nvPr>
+        </p:nvSpPr>
+        <p:spPr>
+          <a:xfrm flipH="1">
+            <a:off x="5687568" y="6355073"/>
+            <a:ext cx="6007608" cy="45719"/>
+          </a:xfrm>
+          <a:prstGeom prst="rect">
+            <a:avLst/>
+          </a:prstGeom>
+          <a:solidFill>
+            <a:schemeClr val="accent4"/>
+          </a:solidFill>
+          <a:ln>
+            <a:noFill/>
+          </a:ln>
+        </p:spPr>
+        <p:style>
+          <a:lnRef idx="2">
+            <a:schemeClr val="accent1">
+              <a:shade val="50000"/>
+            </a:schemeClr>
+          </a:lnRef>
+          <a:fillRef idx="1">
+            <a:schemeClr val="accent1"/>
+          </a:fillRef>
+          <a:effectRef idx="0">
+            <a:schemeClr val="accent1"/>
+          </a:effectRef>
+          <a:fontRef idx="minor">
+            <a:schemeClr val="lt1"/>
+          </a:fontRef>
+        </p:style>
+        <p:txBody>
+          <a:bodyPr rtlCol="0" anchor="ctr"/>
+          <a:lstStyle/>
+          <a:p>
+            <a:pPr algn="ctr"/>
+            <a:endParaRPr lang="en-US"/>
+          </a:p>
+        </p:txBody>
+      </p:sp>
+      <p:pic>
+        <p:nvPicPr>
+          <p:cNvPr id="6" name="Obraz 5">
+            <a:extLst>
+              <a:ext uri="{FF2B5EF4-FFF2-40B4-BE49-F238E27FC236}">
+                <a16:creationId xmlns:a16="http://schemas.microsoft.com/office/drawing/2014/main" id="{3704B6B3-25CB-ED83-AA0B-DDCCBB9F77B0}"/>
+              </a:ext>
+            </a:extLst>
+          </p:cNvPr>
+          <p:cNvPicPr>
+            <a:picLocks noChangeAspect="1"/>
+          </p:cNvPicPr>
+          <p:nvPr/>
+        </p:nvPicPr>
+        <p:blipFill>
+          <a:blip r:embed="rId2"/>
+          <a:stretch>
+            <a:fillRect/>
+          </a:stretch>
+        </p:blipFill>
+        <p:spPr>
+          <a:xfrm>
+            <a:off x="5777200" y="1075368"/>
+            <a:ext cx="5826585" cy="4221771"/>
+          </a:xfrm>
+          <a:prstGeom prst="rect">
+            <a:avLst/>
+          </a:prstGeom>
+        </p:spPr>
+      </p:pic>
     </p:spTree>
     <p:extLst>
       <p:ext uri="{BB962C8B-B14F-4D97-AF65-F5344CB8AC3E}">
@@ -4466,7 +4843,7 @@
         </p:nvSpPr>
         <p:spPr>
           <a:xfrm>
-            <a:off x="4919532" y="2841214"/>
+            <a:off x="9986546" y="297394"/>
             <a:ext cx="2453834" cy="923330"/>
           </a:xfrm>
           <a:prstGeom prst="rect">
@@ -4533,7 +4910,7 @@
               </a:spcBef>
             </a:pPr>
             <a:r>
-              <a:rPr lang="pl-PL" sz="3600" b="1" dirty="0">
+              <a:rPr lang="pl-PL" sz="3600" b="1">
                 <a:ln w="0"/>
                 <a:effectLst>
                   <a:outerShdw blurRad="38100" dist="19050" dir="2700000" algn="tl" rotWithShape="0">
@@ -4562,6 +4939,35 @@
           </a:p>
         </p:txBody>
       </p:sp>
+      <p:pic>
+        <p:nvPicPr>
+          <p:cNvPr id="12" name="Obraz 11">
+            <a:extLst>
+              <a:ext uri="{FF2B5EF4-FFF2-40B4-BE49-F238E27FC236}">
+                <a16:creationId xmlns:a16="http://schemas.microsoft.com/office/drawing/2014/main" id="{11F9D274-93E0-474A-A23F-A9B4893AEF42}"/>
+              </a:ext>
+            </a:extLst>
+          </p:cNvPr>
+          <p:cNvPicPr>
+            <a:picLocks noChangeAspect="1"/>
+          </p:cNvPicPr>
+          <p:nvPr/>
+        </p:nvPicPr>
+        <p:blipFill rotWithShape="1">
+          <a:blip r:embed="rId3"/>
+          <a:srcRect l="342" t="541" r="372" b="323"/>
+          <a:stretch/>
+        </p:blipFill>
+        <p:spPr>
+          <a:xfrm>
+            <a:off x="2618453" y="1354766"/>
+            <a:ext cx="6955092" cy="4806365"/>
+          </a:xfrm>
+          <a:prstGeom prst="rect">
+            <a:avLst/>
+          </a:prstGeom>
+        </p:spPr>
+      </p:pic>
     </p:spTree>
     <p:extLst>
       <p:ext uri="{BB962C8B-B14F-4D97-AF65-F5344CB8AC3E}">
@@ -4606,12 +5012,122 @@
           <a:chExt cx="0" cy="0"/>
         </a:xfrm>
       </p:grpSpPr>
+      <p:sp>
+        <p:nvSpPr>
+          <p:cNvPr id="6" name="pole tekstowe 5">
+            <a:extLst>
+              <a:ext uri="{FF2B5EF4-FFF2-40B4-BE49-F238E27FC236}">
+                <a16:creationId xmlns:a16="http://schemas.microsoft.com/office/drawing/2014/main" id="{CB3D212E-4DFD-9889-89CB-F19B9281C220}"/>
+              </a:ext>
+            </a:extLst>
+          </p:cNvPr>
+          <p:cNvSpPr txBox="1"/>
+          <p:nvPr/>
+        </p:nvSpPr>
+        <p:spPr>
+          <a:xfrm>
+            <a:off x="9986546" y="297394"/>
+            <a:ext cx="2453834" cy="923330"/>
+          </a:xfrm>
+          <a:prstGeom prst="rect">
+            <a:avLst/>
+          </a:prstGeom>
+          <a:noFill/>
+        </p:spPr>
+        <p:txBody>
+          <a:bodyPr wrap="square" rtlCol="0">
+            <a:spAutoFit/>
+          </a:bodyPr>
+          <a:lstStyle/>
+          <a:p>
+            <a:r>
+              <a:rPr lang="pl-PL" dirty="0"/>
+              <a:t>* [demo – 30 sekundowy film, albo seria </a:t>
+            </a:r>
+            <a:r>
+              <a:rPr lang="pl-PL" dirty="0" err="1"/>
+              <a:t>screenów</a:t>
+            </a:r>
+            <a:r>
+              <a:rPr lang="pl-PL" dirty="0"/>
+              <a:t>]</a:t>
+            </a:r>
+            <a:endParaRPr lang="en-GB" dirty="0"/>
+          </a:p>
+        </p:txBody>
+      </p:sp>
+      <p:sp>
+        <p:nvSpPr>
+          <p:cNvPr id="3" name="pole tekstowe 2">
+            <a:extLst>
+              <a:ext uri="{FF2B5EF4-FFF2-40B4-BE49-F238E27FC236}">
+                <a16:creationId xmlns:a16="http://schemas.microsoft.com/office/drawing/2014/main" id="{1AF8A596-2210-82E4-E96D-F587D6119601}"/>
+              </a:ext>
+            </a:extLst>
+          </p:cNvPr>
+          <p:cNvSpPr txBox="1"/>
+          <p:nvPr/>
+        </p:nvSpPr>
+        <p:spPr>
+          <a:xfrm>
+            <a:off x="3987759" y="462965"/>
+            <a:ext cx="4216477" cy="369332"/>
+          </a:xfrm>
+          <a:prstGeom prst="rect">
+            <a:avLst/>
+          </a:prstGeom>
+          <a:noFill/>
+        </p:spPr>
+        <p:txBody>
+          <a:bodyPr wrap="square">
+            <a:spAutoFit/>
+          </a:bodyPr>
+          <a:lstStyle/>
+          <a:p>
+            <a:pPr algn="ctr">
+              <a:lnSpc>
+                <a:spcPct val="90000"/>
+              </a:lnSpc>
+              <a:spcBef>
+                <a:spcPct val="0"/>
+              </a:spcBef>
+            </a:pPr>
+            <a:r>
+              <a:rPr lang="pl-PL" sz="2000" dirty="0">
+                <a:ln w="0"/>
+                <a:effectLst>
+                  <a:outerShdw blurRad="38100" dist="19050" dir="2700000" algn="tl" rotWithShape="0">
+                    <a:schemeClr val="dk1">
+                      <a:alpha val="40000"/>
+                    </a:schemeClr>
+                  </a:outerShdw>
+                </a:effectLst>
+                <a:ea typeface="+mj-ea"/>
+                <a:cs typeface="Times New Roman" panose="02020603050405020304" pitchFamily="18" charset="0"/>
+              </a:rPr>
+              <a:t>Przykład wprowadzenia błędnego linku</a:t>
+            </a:r>
+            <a:endParaRPr lang="en-US" sz="2000" dirty="0">
+              <a:ln w="0"/>
+              <a:effectLst>
+                <a:outerShdw blurRad="38100" dist="19050" dir="2700000" algn="tl" rotWithShape="0">
+                  <a:schemeClr val="dk1">
+                    <a:alpha val="40000"/>
+                  </a:schemeClr>
+                </a:outerShdw>
+              </a:effectLst>
+              <a:ea typeface="+mj-ea"/>
+              <a:cs typeface="Times New Roman" panose="02020603050405020304" pitchFamily="18" charset="0"/>
+            </a:endParaRPr>
+          </a:p>
+        </p:txBody>
+      </p:sp>
       <p:pic>
         <p:nvPicPr>
-          <p:cNvPr id="5" name="Obraz 4">
-            <a:extLst>
-              <a:ext uri="{FF2B5EF4-FFF2-40B4-BE49-F238E27FC236}">
-                <a16:creationId xmlns:a16="http://schemas.microsoft.com/office/drawing/2014/main" id="{5E763AFB-DD3F-B430-35E5-C21FEF498FC4}"/>
+          <p:cNvPr id="7" name="Obraz 6">
+            <a:extLst>
+              <a:ext uri="{FF2B5EF4-FFF2-40B4-BE49-F238E27FC236}">
+                <a16:creationId xmlns:a16="http://schemas.microsoft.com/office/drawing/2014/main" id="{CD458A51-D549-54F5-AAC8-462E1D3EBDED}"/>
               </a:ext>
             </a:extLst>
           </p:cNvPr>
@@ -4628,114 +5144,18 @@
         </p:blipFill>
         <p:spPr>
           <a:xfrm>
-            <a:off x="4009798" y="1545812"/>
-            <a:ext cx="4296154" cy="1751753"/>
+            <a:off x="2609371" y="1358227"/>
+            <a:ext cx="6973255" cy="4801941"/>
           </a:xfrm>
           <a:prstGeom prst="rect">
             <a:avLst/>
           </a:prstGeom>
         </p:spPr>
       </p:pic>
-      <p:pic>
-        <p:nvPicPr>
-          <p:cNvPr id="7" name="Obraz 6">
-            <a:extLst>
-              <a:ext uri="{FF2B5EF4-FFF2-40B4-BE49-F238E27FC236}">
-                <a16:creationId xmlns:a16="http://schemas.microsoft.com/office/drawing/2014/main" id="{8C2F677A-27FF-7388-60AC-3A5A9E21F6AE}"/>
-              </a:ext>
-            </a:extLst>
-          </p:cNvPr>
-          <p:cNvPicPr>
-            <a:picLocks noChangeAspect="1"/>
-          </p:cNvPicPr>
-          <p:nvPr/>
-        </p:nvPicPr>
-        <p:blipFill>
-          <a:blip r:embed="rId4"/>
-          <a:stretch>
-            <a:fillRect/>
-          </a:stretch>
-        </p:blipFill>
-        <p:spPr>
-          <a:xfrm>
-            <a:off x="4009798" y="3429000"/>
-            <a:ext cx="3970364" cy="1562235"/>
-          </a:xfrm>
-          <a:prstGeom prst="rect">
-            <a:avLst/>
-          </a:prstGeom>
-        </p:spPr>
-      </p:pic>
-      <p:sp>
-        <p:nvSpPr>
-          <p:cNvPr id="2" name="pole tekstowe 1">
-            <a:extLst>
-              <a:ext uri="{FF2B5EF4-FFF2-40B4-BE49-F238E27FC236}">
-                <a16:creationId xmlns:a16="http://schemas.microsoft.com/office/drawing/2014/main" id="{D5B9C3F7-205A-746D-27E7-76F09FABD5DD}"/>
-              </a:ext>
-            </a:extLst>
-          </p:cNvPr>
-          <p:cNvSpPr txBox="1"/>
-          <p:nvPr/>
-        </p:nvSpPr>
-        <p:spPr>
-          <a:xfrm>
-            <a:off x="2947469" y="351323"/>
-            <a:ext cx="6297061" cy="590931"/>
-          </a:xfrm>
-          <a:prstGeom prst="rect">
-            <a:avLst/>
-          </a:prstGeom>
-          <a:noFill/>
-        </p:spPr>
-        <p:txBody>
-          <a:bodyPr wrap="square">
-            <a:spAutoFit/>
-          </a:bodyPr>
-          <a:lstStyle/>
-          <a:p>
-            <a:pPr algn="ctr">
-              <a:lnSpc>
-                <a:spcPct val="90000"/>
-              </a:lnSpc>
-              <a:spcBef>
-                <a:spcPct val="0"/>
-              </a:spcBef>
-            </a:pPr>
-            <a:r>
-              <a:rPr lang="pl-PL" sz="3600" b="1" dirty="0">
-                <a:ln w="0"/>
-                <a:effectLst>
-                  <a:outerShdw blurRad="38100" dist="19050" dir="2700000" algn="tl" rotWithShape="0">
-                    <a:schemeClr val="dk1">
-                      <a:alpha val="40000"/>
-                    </a:schemeClr>
-                  </a:outerShdw>
-                </a:effectLst>
-                <a:ea typeface="+mj-ea"/>
-                <a:cs typeface="Times New Roman" panose="02020603050405020304" pitchFamily="18" charset="0"/>
-              </a:rPr>
-              <a:t>Wyniki</a:t>
-            </a:r>
-            <a:endParaRPr lang="en-US" sz="3600" b="1" dirty="0">
-              <a:ln w="0"/>
-              <a:effectLst>
-                <a:outerShdw blurRad="38100" dist="19050" dir="2700000" algn="tl" rotWithShape="0">
-                  <a:schemeClr val="dk1">
-                    <a:alpha val="40000"/>
-                  </a:schemeClr>
-                </a:outerShdw>
-              </a:effectLst>
-              <a:ea typeface="+mj-ea"/>
-              <a:cs typeface="Times New Roman" panose="02020603050405020304" pitchFamily="18" charset="0"/>
-            </a:endParaRPr>
-          </a:p>
-        </p:txBody>
-      </p:sp>
     </p:spTree>
     <p:extLst>
       <p:ext uri="{BB962C8B-B14F-4D97-AF65-F5344CB8AC3E}">
-        <p14:creationId xmlns:p14="http://schemas.microsoft.com/office/powerpoint/2010/main" val="3780764817"/>
+        <p14:creationId xmlns:p14="http://schemas.microsoft.com/office/powerpoint/2010/main" val="3929092065"/>
       </p:ext>
     </p:extLst>
   </p:cSld>
@@ -4776,67 +5196,72 @@
           <a:chExt cx="0" cy="0"/>
         </a:xfrm>
       </p:grpSpPr>
-      <p:sp>
-        <p:nvSpPr>
-          <p:cNvPr id="4" name="pole tekstowe 3">
-            <a:extLst>
-              <a:ext uri="{FF2B5EF4-FFF2-40B4-BE49-F238E27FC236}">
-                <a16:creationId xmlns:a16="http://schemas.microsoft.com/office/drawing/2014/main" id="{34A7E649-DD0A-6E26-0175-C22DDF403733}"/>
-              </a:ext>
-            </a:extLst>
-          </p:cNvPr>
-          <p:cNvSpPr txBox="1"/>
+      <p:pic>
+        <p:nvPicPr>
+          <p:cNvPr id="5" name="Obraz 4">
+            <a:extLst>
+              <a:ext uri="{FF2B5EF4-FFF2-40B4-BE49-F238E27FC236}">
+                <a16:creationId xmlns:a16="http://schemas.microsoft.com/office/drawing/2014/main" id="{5E763AFB-DD3F-B430-35E5-C21FEF498FC4}"/>
+              </a:ext>
+            </a:extLst>
+          </p:cNvPr>
+          <p:cNvPicPr>
+            <a:picLocks noChangeAspect="1"/>
+          </p:cNvPicPr>
           <p:nvPr/>
-        </p:nvSpPr>
+        </p:nvPicPr>
+        <p:blipFill>
+          <a:blip r:embed="rId3"/>
+          <a:stretch>
+            <a:fillRect/>
+          </a:stretch>
+        </p:blipFill>
         <p:spPr>
           <a:xfrm>
-            <a:off x="3406630" y="2961678"/>
-            <a:ext cx="5378738" cy="1200329"/>
+            <a:off x="4009798" y="1545812"/>
+            <a:ext cx="4296154" cy="1751753"/>
           </a:xfrm>
           <a:prstGeom prst="rect">
             <a:avLst/>
           </a:prstGeom>
-          <a:noFill/>
-        </p:spPr>
-        <p:txBody>
-          <a:bodyPr wrap="square" rtlCol="0">
-            <a:spAutoFit/>
-          </a:bodyPr>
-          <a:lstStyle/>
-          <a:p>
-            <a:r>
-              <a:rPr lang="pl-PL" dirty="0"/>
-              <a:t>- trudność w pozyskaniu jakościowych danych w języku polskim</a:t>
-            </a:r>
-          </a:p>
-          <a:p>
-            <a:r>
-              <a:rPr lang="pl-PL" dirty="0"/>
-              <a:t>- top performance</a:t>
-            </a:r>
-          </a:p>
-          <a:p>
-            <a:r>
-              <a:rPr lang="pl-PL" dirty="0"/>
-              <a:t>- jak wypada vs ja (ręcznie </a:t>
-            </a:r>
-            <a:r>
-              <a:rPr lang="pl-PL" dirty="0" err="1"/>
-              <a:t>zetykietyzowane</a:t>
-            </a:r>
-            <a:r>
-              <a:rPr lang="pl-PL" dirty="0"/>
-              <a:t> dane)?</a:t>
-            </a:r>
-          </a:p>
-        </p:txBody>
-      </p:sp>
+        </p:spPr>
+      </p:pic>
+      <p:pic>
+        <p:nvPicPr>
+          <p:cNvPr id="7" name="Obraz 6">
+            <a:extLst>
+              <a:ext uri="{FF2B5EF4-FFF2-40B4-BE49-F238E27FC236}">
+                <a16:creationId xmlns:a16="http://schemas.microsoft.com/office/drawing/2014/main" id="{8C2F677A-27FF-7388-60AC-3A5A9E21F6AE}"/>
+              </a:ext>
+            </a:extLst>
+          </p:cNvPr>
+          <p:cNvPicPr>
+            <a:picLocks noChangeAspect="1"/>
+          </p:cNvPicPr>
+          <p:nvPr/>
+        </p:nvPicPr>
+        <p:blipFill>
+          <a:blip r:embed="rId4"/>
+          <a:stretch>
+            <a:fillRect/>
+          </a:stretch>
+        </p:blipFill>
+        <p:spPr>
+          <a:xfrm>
+            <a:off x="4009798" y="3429000"/>
+            <a:ext cx="3970364" cy="1562235"/>
+          </a:xfrm>
+          <a:prstGeom prst="rect">
+            <a:avLst/>
+          </a:prstGeom>
+        </p:spPr>
+      </p:pic>
       <p:sp>
         <p:nvSpPr>
           <p:cNvPr id="2" name="pole tekstowe 1">
             <a:extLst>
               <a:ext uri="{FF2B5EF4-FFF2-40B4-BE49-F238E27FC236}">
-                <a16:creationId xmlns:a16="http://schemas.microsoft.com/office/drawing/2014/main" id="{A1C80236-077A-9F46-133F-602C0A806BA0}"/>
+                <a16:creationId xmlns:a16="http://schemas.microsoft.com/office/drawing/2014/main" id="{D5B9C3F7-205A-746D-27E7-76F09FABD5DD}"/>
               </a:ext>
             </a:extLst>
           </p:cNvPr>
@@ -4880,7 +5305,7 @@
                 <a:ea typeface="+mj-ea"/>
                 <a:cs typeface="Times New Roman" panose="02020603050405020304" pitchFamily="18" charset="0"/>
               </a:rPr>
-              <a:t>Wnioski</a:t>
+              <a:t>Wyniki</a:t>
             </a:r>
             <a:endParaRPr lang="en-US" sz="3600" b="1" dirty="0">
               <a:ln w="0"/>
@@ -4900,7 +5325,7 @@
     </p:spTree>
     <p:extLst>
       <p:ext uri="{BB962C8B-B14F-4D97-AF65-F5344CB8AC3E}">
-        <p14:creationId xmlns:p14="http://schemas.microsoft.com/office/powerpoint/2010/main" val="2198184847"/>
+        <p14:creationId xmlns:p14="http://schemas.microsoft.com/office/powerpoint/2010/main" val="3780764817"/>
       </p:ext>
     </p:extLst>
   </p:cSld>
@@ -4946,6 +5371,171 @@
           <p:cNvPr id="4" name="pole tekstowe 3">
             <a:extLst>
               <a:ext uri="{FF2B5EF4-FFF2-40B4-BE49-F238E27FC236}">
+                <a16:creationId xmlns:a16="http://schemas.microsoft.com/office/drawing/2014/main" id="{34A7E649-DD0A-6E26-0175-C22DDF403733}"/>
+              </a:ext>
+            </a:extLst>
+          </p:cNvPr>
+          <p:cNvSpPr txBox="1"/>
+          <p:nvPr/>
+        </p:nvSpPr>
+        <p:spPr>
+          <a:xfrm>
+            <a:off x="3406630" y="2961678"/>
+            <a:ext cx="5378738" cy="1200329"/>
+          </a:xfrm>
+          <a:prstGeom prst="rect">
+            <a:avLst/>
+          </a:prstGeom>
+          <a:noFill/>
+        </p:spPr>
+        <p:txBody>
+          <a:bodyPr wrap="square" rtlCol="0">
+            <a:spAutoFit/>
+          </a:bodyPr>
+          <a:lstStyle/>
+          <a:p>
+            <a:r>
+              <a:rPr lang="pl-PL" dirty="0"/>
+              <a:t>- trudność w pozyskaniu jakościowych danych w języku polskim</a:t>
+            </a:r>
+          </a:p>
+          <a:p>
+            <a:r>
+              <a:rPr lang="pl-PL" dirty="0"/>
+              <a:t>- top performance</a:t>
+            </a:r>
+          </a:p>
+          <a:p>
+            <a:r>
+              <a:rPr lang="pl-PL" dirty="0"/>
+              <a:t>- jak wypada vs ja (ręcznie </a:t>
+            </a:r>
+            <a:r>
+              <a:rPr lang="pl-PL" dirty="0" err="1"/>
+              <a:t>zetykietyzowane</a:t>
+            </a:r>
+            <a:r>
+              <a:rPr lang="pl-PL" dirty="0"/>
+              <a:t> dane)?</a:t>
+            </a:r>
+          </a:p>
+        </p:txBody>
+      </p:sp>
+      <p:sp>
+        <p:nvSpPr>
+          <p:cNvPr id="2" name="pole tekstowe 1">
+            <a:extLst>
+              <a:ext uri="{FF2B5EF4-FFF2-40B4-BE49-F238E27FC236}">
+                <a16:creationId xmlns:a16="http://schemas.microsoft.com/office/drawing/2014/main" id="{A1C80236-077A-9F46-133F-602C0A806BA0}"/>
+              </a:ext>
+            </a:extLst>
+          </p:cNvPr>
+          <p:cNvSpPr txBox="1"/>
+          <p:nvPr/>
+        </p:nvSpPr>
+        <p:spPr>
+          <a:xfrm>
+            <a:off x="2947469" y="351323"/>
+            <a:ext cx="6297061" cy="590931"/>
+          </a:xfrm>
+          <a:prstGeom prst="rect">
+            <a:avLst/>
+          </a:prstGeom>
+          <a:noFill/>
+        </p:spPr>
+        <p:txBody>
+          <a:bodyPr wrap="square">
+            <a:spAutoFit/>
+          </a:bodyPr>
+          <a:lstStyle/>
+          <a:p>
+            <a:pPr algn="ctr">
+              <a:lnSpc>
+                <a:spcPct val="90000"/>
+              </a:lnSpc>
+              <a:spcBef>
+                <a:spcPct val="0"/>
+              </a:spcBef>
+            </a:pPr>
+            <a:r>
+              <a:rPr lang="pl-PL" sz="3600" b="1" dirty="0">
+                <a:ln w="0"/>
+                <a:effectLst>
+                  <a:outerShdw blurRad="38100" dist="19050" dir="2700000" algn="tl" rotWithShape="0">
+                    <a:schemeClr val="dk1">
+                      <a:alpha val="40000"/>
+                    </a:schemeClr>
+                  </a:outerShdw>
+                </a:effectLst>
+                <a:ea typeface="+mj-ea"/>
+                <a:cs typeface="Times New Roman" panose="02020603050405020304" pitchFamily="18" charset="0"/>
+              </a:rPr>
+              <a:t>Wnioski</a:t>
+            </a:r>
+            <a:endParaRPr lang="en-US" sz="3600" b="1" dirty="0">
+              <a:ln w="0"/>
+              <a:effectLst>
+                <a:outerShdw blurRad="38100" dist="19050" dir="2700000" algn="tl" rotWithShape="0">
+                  <a:schemeClr val="dk1">
+                    <a:alpha val="40000"/>
+                  </a:schemeClr>
+                </a:outerShdw>
+              </a:effectLst>
+              <a:ea typeface="+mj-ea"/>
+              <a:cs typeface="Times New Roman" panose="02020603050405020304" pitchFamily="18" charset="0"/>
+            </a:endParaRPr>
+          </a:p>
+        </p:txBody>
+      </p:sp>
+    </p:spTree>
+    <p:extLst>
+      <p:ext uri="{BB962C8B-B14F-4D97-AF65-F5344CB8AC3E}">
+        <p14:creationId xmlns:p14="http://schemas.microsoft.com/office/powerpoint/2010/main" val="2198184847"/>
+      </p:ext>
+    </p:extLst>
+  </p:cSld>
+  <p:clrMapOvr>
+    <a:masterClrMapping/>
+  </p:clrMapOvr>
+</p:sld>
+</file>
+
+<file path=ppt/slides/slide15.xml><?xml version="1.0" encoding="utf-8"?>
+<p:sld xmlns:a="http://schemas.openxmlformats.org/drawingml/2006/main" xmlns:r="http://schemas.openxmlformats.org/officeDocument/2006/relationships" xmlns:p="http://schemas.openxmlformats.org/presentationml/2006/main">
+  <p:cSld>
+    <p:bg>
+      <p:bgPr>
+        <a:blipFill dpi="0" rotWithShape="1">
+          <a:blip r:embed="rId2">
+            <a:lum/>
+          </a:blip>
+          <a:srcRect/>
+          <a:stretch>
+            <a:fillRect/>
+          </a:stretch>
+        </a:blipFill>
+        <a:effectLst/>
+      </p:bgPr>
+    </p:bg>
+    <p:spTree>
+      <p:nvGrpSpPr>
+        <p:cNvPr id="1" name=""/>
+        <p:cNvGrpSpPr/>
+        <p:nvPr/>
+      </p:nvGrpSpPr>
+      <p:grpSpPr>
+        <a:xfrm>
+          <a:off x="0" y="0"/>
+          <a:ext cx="0" cy="0"/>
+          <a:chOff x="0" y="0"/>
+          <a:chExt cx="0" cy="0"/>
+        </a:xfrm>
+      </p:grpSpPr>
+      <p:sp>
+        <p:nvSpPr>
+          <p:cNvPr id="4" name="pole tekstowe 3">
+            <a:extLst>
+              <a:ext uri="{FF2B5EF4-FFF2-40B4-BE49-F238E27FC236}">
                 <a16:creationId xmlns:a16="http://schemas.microsoft.com/office/drawing/2014/main" id="{DE6106C7-69F1-2A09-AC7C-3C5182741335}"/>
               </a:ext>
             </a:extLst>
@@ -5083,7 +5673,7 @@
 </p:sld>
 </file>
 
-<file path=ppt/slides/slide15.xml><?xml version="1.0" encoding="utf-8"?>
+<file path=ppt/slides/slide16.xml><?xml version="1.0" encoding="utf-8"?>
 <p:sld xmlns:a="http://schemas.openxmlformats.org/drawingml/2006/main" xmlns:r="http://schemas.openxmlformats.org/officeDocument/2006/relationships" xmlns:p="http://schemas.openxmlformats.org/presentationml/2006/main">
   <p:cSld>
     <p:bg>

</xml_diff>